<commit_message>
Created website Created website css Created test site to test javascript on canvas Created javascript file for pencil tool
</commit_message>
<xml_diff>
--- a/Documentation/MockUp.pptx
+++ b/Documentation/MockUp.pptx
@@ -6,6 +6,7 @@
   </p:sldMasterIdLst>
   <p:sldIdLst>
     <p:sldId id="256" r:id="rId2"/>
+    <p:sldId id="257" r:id="rId3"/>
   </p:sldIdLst>
   <p:sldSz cx="9144000" cy="6858000" type="screen4x3"/>
   <p:notesSz cx="6858000" cy="9144000"/>
@@ -3081,6 +3082,14 @@
 <file path=ppt/slides/slide1.xml><?xml version="1.0" encoding="utf-8"?>
 <p:sld xmlns:a="http://schemas.openxmlformats.org/drawingml/2006/main" xmlns:r="http://schemas.openxmlformats.org/officeDocument/2006/relationships" xmlns:p="http://schemas.openxmlformats.org/presentationml/2006/main">
   <p:cSld>
+    <p:bg>
+      <p:bgPr>
+        <a:solidFill>
+          <a:srgbClr val="F0F0F0"/>
+        </a:solidFill>
+        <a:effectLst/>
+      </p:bgPr>
+    </p:bg>
     <p:spTree>
       <p:nvGrpSpPr>
         <p:cNvPr id="1" name=""/>
@@ -3097,39 +3106,150 @@
       </p:grpSpPr>
       <p:sp>
         <p:nvSpPr>
-          <p:cNvPr id="2" name="Title 1"/>
-          <p:cNvSpPr>
-            <a:spLocks noGrp="1"/>
-          </p:cNvSpPr>
-          <p:nvPr>
-            <p:ph type="ctrTitle"/>
-          </p:nvPr>
-        </p:nvSpPr>
-        <p:spPr/>
-        <p:txBody>
-          <a:bodyPr/>
-          <a:lstStyle/>
-          <a:p>
-            <a:endParaRPr lang="en-US"/>
-          </a:p>
-        </p:txBody>
-      </p:sp>
-      <p:sp>
-        <p:nvSpPr>
-          <p:cNvPr id="3" name="Subtitle 2"/>
-          <p:cNvSpPr>
-            <a:spLocks noGrp="1"/>
-          </p:cNvSpPr>
-          <p:nvPr>
-            <p:ph type="subTitle" idx="1"/>
-          </p:nvPr>
-        </p:nvSpPr>
-        <p:spPr/>
-        <p:txBody>
-          <a:bodyPr/>
-          <a:lstStyle/>
-          <a:p>
-            <a:endParaRPr lang="en-US"/>
+          <p:cNvPr id="6" name="Snip Same Side Corner Rectangle 5"/>
+          <p:cNvSpPr/>
+          <p:nvPr/>
+        </p:nvSpPr>
+        <p:spPr>
+          <a:xfrm rot="5400000">
+            <a:off x="-166287" y="770190"/>
+            <a:ext cx="533400" cy="228600"/>
+          </a:xfrm>
+          <a:prstGeom prst="snip2SameRect">
+            <a:avLst>
+              <a:gd name="adj1" fmla="val 16667"/>
+              <a:gd name="adj2" fmla="val 0"/>
+            </a:avLst>
+          </a:prstGeom>
+          <a:solidFill>
+            <a:schemeClr val="bg1">
+              <a:lumMod val="50000"/>
+              <a:alpha val="75000"/>
+            </a:schemeClr>
+          </a:solidFill>
+          <a:ln>
+            <a:noFill/>
+          </a:ln>
+        </p:spPr>
+        <p:style>
+          <a:lnRef idx="2">
+            <a:schemeClr val="accent1">
+              <a:shade val="50000"/>
+            </a:schemeClr>
+          </a:lnRef>
+          <a:fillRef idx="1">
+            <a:schemeClr val="accent1"/>
+          </a:fillRef>
+          <a:effectRef idx="0">
+            <a:schemeClr val="accent1"/>
+          </a:effectRef>
+          <a:fontRef idx="minor">
+            <a:schemeClr val="lt1"/>
+          </a:fontRef>
+        </p:style>
+        <p:txBody>
+          <a:bodyPr rtlCol="0" anchor="ctr"/>
+          <a:lstStyle/>
+          <a:p>
+            <a:pPr algn="ctr"/>
+            <a:endParaRPr lang="en-US"/>
+          </a:p>
+        </p:txBody>
+      </p:sp>
+      <p:sp>
+        <p:nvSpPr>
+          <p:cNvPr id="7" name="Isosceles Triangle 6"/>
+          <p:cNvSpPr/>
+          <p:nvPr/>
+        </p:nvSpPr>
+        <p:spPr>
+          <a:xfrm rot="5400000">
+            <a:off x="43263" y="846925"/>
+            <a:ext cx="114300" cy="94360"/>
+          </a:xfrm>
+          <a:prstGeom prst="triangle">
+            <a:avLst/>
+          </a:prstGeom>
+          <a:solidFill>
+            <a:srgbClr val="F0F0F0">
+              <a:alpha val="50000"/>
+            </a:srgbClr>
+          </a:solidFill>
+          <a:ln>
+            <a:noFill/>
+          </a:ln>
+        </p:spPr>
+        <p:style>
+          <a:lnRef idx="2">
+            <a:schemeClr val="accent1">
+              <a:shade val="50000"/>
+            </a:schemeClr>
+          </a:lnRef>
+          <a:fillRef idx="1">
+            <a:schemeClr val="accent1"/>
+          </a:fillRef>
+          <a:effectRef idx="0">
+            <a:schemeClr val="accent1"/>
+          </a:effectRef>
+          <a:fontRef idx="minor">
+            <a:schemeClr val="lt1"/>
+          </a:fontRef>
+        </p:style>
+        <p:txBody>
+          <a:bodyPr rtlCol="0" anchor="ctr"/>
+          <a:lstStyle/>
+          <a:p>
+            <a:pPr algn="ctr"/>
+            <a:endParaRPr lang="en-US"/>
+          </a:p>
+        </p:txBody>
+      </p:sp>
+      <p:sp>
+        <p:nvSpPr>
+          <p:cNvPr id="8" name="Rectangle 7"/>
+          <p:cNvSpPr/>
+          <p:nvPr/>
+        </p:nvSpPr>
+        <p:spPr>
+          <a:xfrm>
+            <a:off x="0" y="0"/>
+            <a:ext cx="1219200" cy="6858000"/>
+          </a:xfrm>
+          <a:prstGeom prst="rect">
+            <a:avLst/>
+          </a:prstGeom>
+          <a:solidFill>
+            <a:schemeClr val="bg1">
+              <a:lumMod val="50000"/>
+              <a:alpha val="75000"/>
+            </a:schemeClr>
+          </a:solidFill>
+          <a:ln>
+            <a:noFill/>
+          </a:ln>
+        </p:spPr>
+        <p:style>
+          <a:lnRef idx="2">
+            <a:schemeClr val="accent1">
+              <a:shade val="50000"/>
+            </a:schemeClr>
+          </a:lnRef>
+          <a:fillRef idx="1">
+            <a:schemeClr val="accent1"/>
+          </a:fillRef>
+          <a:effectRef idx="0">
+            <a:schemeClr val="accent1"/>
+          </a:effectRef>
+          <a:fontRef idx="minor">
+            <a:schemeClr val="lt1"/>
+          </a:fontRef>
+        </p:style>
+        <p:txBody>
+          <a:bodyPr rtlCol="0" anchor="ctr"/>
+          <a:lstStyle/>
+          <a:p>
+            <a:pPr algn="ctr"/>
+            <a:endParaRPr lang="en-US" dirty="0"/>
           </a:p>
         </p:txBody>
       </p:sp>
@@ -3143,6 +3263,296 @@
   <p:clrMapOvr>
     <a:masterClrMapping/>
   </p:clrMapOvr>
+  <p:timing>
+    <p:tnLst>
+      <p:par>
+        <p:cTn id="1" dur="indefinite" restart="never" nodeType="tmRoot">
+          <p:childTnLst>
+            <p:seq concurrent="1" nextAc="seek">
+              <p:cTn id="2" dur="indefinite" nodeType="mainSeq">
+                <p:childTnLst>
+                  <p:par>
+                    <p:cTn id="3" fill="hold">
+                      <p:stCondLst>
+                        <p:cond delay="indefinite"/>
+                      </p:stCondLst>
+                      <p:childTnLst>
+                        <p:par>
+                          <p:cTn id="4" fill="hold">
+                            <p:stCondLst>
+                              <p:cond delay="0"/>
+                            </p:stCondLst>
+                            <p:childTnLst>
+                              <p:par>
+                                <p:cTn id="5" presetID="10" presetClass="exit" presetSubtype="0" fill="hold" grpId="0" nodeType="clickEffect">
+                                  <p:stCondLst>
+                                    <p:cond delay="0"/>
+                                  </p:stCondLst>
+                                  <p:childTnLst>
+                                    <p:animEffect transition="out" filter="fade">
+                                      <p:cBhvr>
+                                        <p:cTn id="6" dur="500"/>
+                                        <p:tgtEl>
+                                          <p:spTgt spid="6"/>
+                                        </p:tgtEl>
+                                      </p:cBhvr>
+                                    </p:animEffect>
+                                    <p:set>
+                                      <p:cBhvr>
+                                        <p:cTn id="7" dur="1" fill="hold">
+                                          <p:stCondLst>
+                                            <p:cond delay="499"/>
+                                          </p:stCondLst>
+                                        </p:cTn>
+                                        <p:tgtEl>
+                                          <p:spTgt spid="6"/>
+                                        </p:tgtEl>
+                                        <p:attrNameLst>
+                                          <p:attrName>style.visibility</p:attrName>
+                                        </p:attrNameLst>
+                                      </p:cBhvr>
+                                      <p:to>
+                                        <p:strVal val="hidden"/>
+                                      </p:to>
+                                    </p:set>
+                                  </p:childTnLst>
+                                </p:cTn>
+                              </p:par>
+                              <p:par>
+                                <p:cTn id="8" presetID="10" presetClass="exit" presetSubtype="0" fill="hold" grpId="0" nodeType="withEffect">
+                                  <p:stCondLst>
+                                    <p:cond delay="0"/>
+                                  </p:stCondLst>
+                                  <p:childTnLst>
+                                    <p:animEffect transition="out" filter="fade">
+                                      <p:cBhvr>
+                                        <p:cTn id="9" dur="500"/>
+                                        <p:tgtEl>
+                                          <p:spTgt spid="7"/>
+                                        </p:tgtEl>
+                                      </p:cBhvr>
+                                    </p:animEffect>
+                                    <p:set>
+                                      <p:cBhvr>
+                                        <p:cTn id="10" dur="1" fill="hold">
+                                          <p:stCondLst>
+                                            <p:cond delay="499"/>
+                                          </p:stCondLst>
+                                        </p:cTn>
+                                        <p:tgtEl>
+                                          <p:spTgt spid="7"/>
+                                        </p:tgtEl>
+                                        <p:attrNameLst>
+                                          <p:attrName>style.visibility</p:attrName>
+                                        </p:attrNameLst>
+                                      </p:cBhvr>
+                                      <p:to>
+                                        <p:strVal val="hidden"/>
+                                      </p:to>
+                                    </p:set>
+                                  </p:childTnLst>
+                                </p:cTn>
+                              </p:par>
+                              <p:par>
+                                <p:cTn id="11" presetID="2" presetClass="entr" presetSubtype="8" fill="hold" grpId="0" nodeType="withEffect">
+                                  <p:stCondLst>
+                                    <p:cond delay="200"/>
+                                  </p:stCondLst>
+                                  <p:childTnLst>
+                                    <p:set>
+                                      <p:cBhvr>
+                                        <p:cTn id="12" dur="1" fill="hold">
+                                          <p:stCondLst>
+                                            <p:cond delay="0"/>
+                                          </p:stCondLst>
+                                        </p:cTn>
+                                        <p:tgtEl>
+                                          <p:spTgt spid="8"/>
+                                        </p:tgtEl>
+                                        <p:attrNameLst>
+                                          <p:attrName>style.visibility</p:attrName>
+                                        </p:attrNameLst>
+                                      </p:cBhvr>
+                                      <p:to>
+                                        <p:strVal val="visible"/>
+                                      </p:to>
+                                    </p:set>
+                                    <p:anim calcmode="lin" valueType="num">
+                                      <p:cBhvr additive="base">
+                                        <p:cTn id="13" dur="500" fill="hold"/>
+                                        <p:tgtEl>
+                                          <p:spTgt spid="8"/>
+                                        </p:tgtEl>
+                                        <p:attrNameLst>
+                                          <p:attrName>ppt_x</p:attrName>
+                                        </p:attrNameLst>
+                                      </p:cBhvr>
+                                      <p:tavLst>
+                                        <p:tav tm="0">
+                                          <p:val>
+                                            <p:strVal val="0-#ppt_w/2"/>
+                                          </p:val>
+                                        </p:tav>
+                                        <p:tav tm="100000">
+                                          <p:val>
+                                            <p:strVal val="#ppt_x"/>
+                                          </p:val>
+                                        </p:tav>
+                                      </p:tavLst>
+                                    </p:anim>
+                                    <p:anim calcmode="lin" valueType="num">
+                                      <p:cBhvr additive="base">
+                                        <p:cTn id="14" dur="500" fill="hold"/>
+                                        <p:tgtEl>
+                                          <p:spTgt spid="8"/>
+                                        </p:tgtEl>
+                                        <p:attrNameLst>
+                                          <p:attrName>ppt_y</p:attrName>
+                                        </p:attrNameLst>
+                                      </p:cBhvr>
+                                      <p:tavLst>
+                                        <p:tav tm="0">
+                                          <p:val>
+                                            <p:strVal val="#ppt_y"/>
+                                          </p:val>
+                                        </p:tav>
+                                        <p:tav tm="100000">
+                                          <p:val>
+                                            <p:strVal val="#ppt_y"/>
+                                          </p:val>
+                                        </p:tav>
+                                      </p:tavLst>
+                                    </p:anim>
+                                  </p:childTnLst>
+                                </p:cTn>
+                              </p:par>
+                            </p:childTnLst>
+                          </p:cTn>
+                        </p:par>
+                      </p:childTnLst>
+                    </p:cTn>
+                  </p:par>
+                </p:childTnLst>
+              </p:cTn>
+              <p:prevCondLst>
+                <p:cond evt="onPrev" delay="0">
+                  <p:tgtEl>
+                    <p:sldTgt/>
+                  </p:tgtEl>
+                </p:cond>
+              </p:prevCondLst>
+              <p:nextCondLst>
+                <p:cond evt="onNext" delay="0">
+                  <p:tgtEl>
+                    <p:sldTgt/>
+                  </p:tgtEl>
+                </p:cond>
+              </p:nextCondLst>
+            </p:seq>
+          </p:childTnLst>
+        </p:cTn>
+      </p:par>
+    </p:tnLst>
+    <p:bldLst>
+      <p:bldP spid="6" grpId="0" animBg="1"/>
+      <p:bldP spid="7" grpId="0" animBg="1"/>
+      <p:bldP spid="8" grpId="0" animBg="1"/>
+    </p:bldLst>
+  </p:timing>
+</p:sld>
+</file>
+
+<file path=ppt/slides/slide2.xml><?xml version="1.0" encoding="utf-8"?>
+<p:sld xmlns:a="http://schemas.openxmlformats.org/drawingml/2006/main" xmlns:r="http://schemas.openxmlformats.org/officeDocument/2006/relationships" xmlns:p="http://schemas.openxmlformats.org/presentationml/2006/main">
+  <p:cSld>
+    <p:bg>
+      <p:bgPr>
+        <a:solidFill>
+          <a:srgbClr val="F0F0F0"/>
+        </a:solidFill>
+        <a:effectLst/>
+      </p:bgPr>
+    </p:bg>
+    <p:spTree>
+      <p:nvGrpSpPr>
+        <p:cNvPr id="1" name=""/>
+        <p:cNvGrpSpPr/>
+        <p:nvPr/>
+      </p:nvGrpSpPr>
+      <p:grpSpPr>
+        <a:xfrm>
+          <a:off x="0" y="0"/>
+          <a:ext cx="0" cy="0"/>
+          <a:chOff x="0" y="0"/>
+          <a:chExt cx="0" cy="0"/>
+        </a:xfrm>
+      </p:grpSpPr>
+      <p:sp>
+        <p:nvSpPr>
+          <p:cNvPr id="3" name="Rectangle 2"/>
+          <p:cNvSpPr/>
+          <p:nvPr/>
+        </p:nvSpPr>
+        <p:spPr>
+          <a:xfrm>
+            <a:off x="0" y="0"/>
+            <a:ext cx="1219200" cy="6858000"/>
+          </a:xfrm>
+          <a:prstGeom prst="rect">
+            <a:avLst/>
+          </a:prstGeom>
+          <a:solidFill>
+            <a:schemeClr val="bg1">
+              <a:lumMod val="50000"/>
+              <a:alpha val="75000"/>
+            </a:schemeClr>
+          </a:solidFill>
+          <a:ln>
+            <a:noFill/>
+          </a:ln>
+        </p:spPr>
+        <p:style>
+          <a:lnRef idx="2">
+            <a:schemeClr val="accent1">
+              <a:shade val="50000"/>
+            </a:schemeClr>
+          </a:lnRef>
+          <a:fillRef idx="1">
+            <a:schemeClr val="accent1"/>
+          </a:fillRef>
+          <a:effectRef idx="0">
+            <a:schemeClr val="accent1"/>
+          </a:effectRef>
+          <a:fontRef idx="minor">
+            <a:schemeClr val="lt1"/>
+          </a:fontRef>
+        </p:style>
+        <p:txBody>
+          <a:bodyPr rtlCol="0" anchor="ctr"/>
+          <a:lstStyle/>
+          <a:p>
+            <a:pPr algn="ctr"/>
+            <a:endParaRPr lang="en-US" dirty="0"/>
+          </a:p>
+        </p:txBody>
+      </p:sp>
+    </p:spTree>
+    <p:extLst>
+      <p:ext uri="{BB962C8B-B14F-4D97-AF65-F5344CB8AC3E}">
+        <p14:creationId xmlns:p14="http://schemas.microsoft.com/office/powerpoint/2010/main" val="3398909492"/>
+      </p:ext>
+    </p:extLst>
+  </p:cSld>
+  <p:clrMapOvr>
+    <a:masterClrMapping/>
+  </p:clrMapOvr>
+  <p:timing>
+    <p:tnLst>
+      <p:par>
+        <p:cTn id="1" dur="indefinite" restart="never" nodeType="tmRoot"/>
+      </p:par>
+    </p:tnLst>
+  </p:timing>
 </p:sld>
 </file>
 

</xml_diff>